<commit_message>
Added to final presentation
</commit_message>
<xml_diff>
--- a/Final Presentation.pptx
+++ b/Final Presentation.pptx
@@ -10,6 +10,9 @@
     <p:sldId id="258" r:id="rId4"/>
     <p:sldId id="259" r:id="rId5"/>
     <p:sldId id="260" r:id="rId6"/>
+    <p:sldId id="261" r:id="rId7"/>
+    <p:sldId id="262" r:id="rId8"/>
+    <p:sldId id="263" r:id="rId9"/>
   </p:sldIdLst>
   <p:sldSz cx="12192000" cy="6858000"/>
   <p:notesSz cx="6858000" cy="9144000"/>
@@ -6293,10 +6296,662 @@
           </a:p>
         </p:txBody>
       </p:sp>
+      <p:sp>
+        <p:nvSpPr>
+          <p:cNvPr id="6" name="Content Placeholder 2">
+            <a:extLst>
+              <a:ext uri="{FF2B5EF4-FFF2-40B4-BE49-F238E27FC236}">
+                <a16:creationId xmlns:a16="http://schemas.microsoft.com/office/drawing/2014/main" id="{AF223E36-C838-7046-9901-8A6320EC2281}"/>
+              </a:ext>
+            </a:extLst>
+          </p:cNvPr>
+          <p:cNvSpPr txBox="1">
+            <a:spLocks/>
+          </p:cNvSpPr>
+          <p:nvPr/>
+        </p:nvSpPr>
+        <p:spPr>
+          <a:xfrm>
+            <a:off x="5799552" y="1610327"/>
+            <a:ext cx="5359708" cy="2376046"/>
+          </a:xfrm>
+          <a:prstGeom prst="rect">
+            <a:avLst/>
+          </a:prstGeom>
+          <a:ln>
+            <a:solidFill>
+              <a:schemeClr val="tx2"/>
+            </a:solidFill>
+          </a:ln>
+        </p:spPr>
+        <p:txBody>
+          <a:bodyPr vert="horz" lIns="91440" tIns="45720" rIns="91440" bIns="45720" rtlCol="0">
+            <a:noAutofit/>
+          </a:bodyPr>
+          <a:lstStyle>
+            <a:lvl1pPr marL="344488" indent="-344488" algn="l" defTabSz="914400" rtl="0" eaLnBrk="1" latinLnBrk="0" hangingPunct="1">
+              <a:lnSpc>
+                <a:spcPct val="120000"/>
+              </a:lnSpc>
+              <a:spcBef>
+                <a:spcPts val="1000"/>
+              </a:spcBef>
+              <a:spcAft>
+                <a:spcPts val="600"/>
+              </a:spcAft>
+              <a:buClr>
+                <a:schemeClr val="accent6"/>
+              </a:buClr>
+              <a:buSzPct val="90000"/>
+              <a:buFont typeface="Wingdings" panose="05000000000000000000" pitchFamily="2" charset="2"/>
+              <a:buChar char="§"/>
+              <a:defRPr sz="2000" kern="1200">
+                <a:solidFill>
+                  <a:schemeClr val="tx1"/>
+                </a:solidFill>
+                <a:effectLst/>
+                <a:latin typeface="+mn-lt"/>
+                <a:ea typeface="+mn-ea"/>
+                <a:cs typeface="+mn-cs"/>
+              </a:defRPr>
+            </a:lvl1pPr>
+            <a:lvl2pPr marL="795338" indent="-338138" algn="l" defTabSz="914400" rtl="0" eaLnBrk="1" latinLnBrk="0" hangingPunct="1">
+              <a:lnSpc>
+                <a:spcPct val="120000"/>
+              </a:lnSpc>
+              <a:spcBef>
+                <a:spcPts val="500"/>
+              </a:spcBef>
+              <a:spcAft>
+                <a:spcPts val="600"/>
+              </a:spcAft>
+              <a:buClr>
+                <a:schemeClr val="accent6"/>
+              </a:buClr>
+              <a:buSzPct val="90000"/>
+              <a:buFont typeface="Wingdings" panose="05000000000000000000" pitchFamily="2" charset="2"/>
+              <a:buChar char="§"/>
+              <a:defRPr sz="1800" kern="1200">
+                <a:solidFill>
+                  <a:schemeClr val="tx1"/>
+                </a:solidFill>
+                <a:effectLst/>
+                <a:latin typeface="+mn-lt"/>
+                <a:ea typeface="+mn-ea"/>
+                <a:cs typeface="+mn-cs"/>
+              </a:defRPr>
+            </a:lvl2pPr>
+            <a:lvl3pPr marL="1258888" indent="-344488" algn="l" defTabSz="914400" rtl="0" eaLnBrk="1" latinLnBrk="0" hangingPunct="1">
+              <a:lnSpc>
+                <a:spcPct val="120000"/>
+              </a:lnSpc>
+              <a:spcBef>
+                <a:spcPts val="500"/>
+              </a:spcBef>
+              <a:spcAft>
+                <a:spcPts val="600"/>
+              </a:spcAft>
+              <a:buClr>
+                <a:schemeClr val="accent6"/>
+              </a:buClr>
+              <a:buSzPct val="90000"/>
+              <a:buFont typeface="Wingdings" panose="05000000000000000000" pitchFamily="2" charset="2"/>
+              <a:buChar char="§"/>
+              <a:defRPr sz="1600" kern="1200">
+                <a:solidFill>
+                  <a:schemeClr val="tx1"/>
+                </a:solidFill>
+                <a:effectLst/>
+                <a:latin typeface="+mn-lt"/>
+                <a:ea typeface="+mn-ea"/>
+                <a:cs typeface="+mn-cs"/>
+              </a:defRPr>
+            </a:lvl3pPr>
+            <a:lvl4pPr marL="1709738" indent="-338138" algn="l" defTabSz="914400" rtl="0" eaLnBrk="1" latinLnBrk="0" hangingPunct="1">
+              <a:lnSpc>
+                <a:spcPct val="120000"/>
+              </a:lnSpc>
+              <a:spcBef>
+                <a:spcPts val="500"/>
+              </a:spcBef>
+              <a:spcAft>
+                <a:spcPts val="600"/>
+              </a:spcAft>
+              <a:buClr>
+                <a:schemeClr val="accent6"/>
+              </a:buClr>
+              <a:buSzPct val="90000"/>
+              <a:buFont typeface="Wingdings" panose="05000000000000000000" pitchFamily="2" charset="2"/>
+              <a:buChar char="§"/>
+              <a:defRPr sz="1400" kern="1200">
+                <a:solidFill>
+                  <a:schemeClr val="tx1"/>
+                </a:solidFill>
+                <a:effectLst/>
+                <a:latin typeface="+mn-lt"/>
+                <a:ea typeface="+mn-ea"/>
+                <a:cs typeface="+mn-cs"/>
+              </a:defRPr>
+            </a:lvl4pPr>
+            <a:lvl5pPr marL="2173288" indent="-344488" algn="l" defTabSz="914400" rtl="0" eaLnBrk="1" latinLnBrk="0" hangingPunct="1">
+              <a:lnSpc>
+                <a:spcPct val="120000"/>
+              </a:lnSpc>
+              <a:spcBef>
+                <a:spcPts val="500"/>
+              </a:spcBef>
+              <a:spcAft>
+                <a:spcPts val="600"/>
+              </a:spcAft>
+              <a:buClr>
+                <a:schemeClr val="accent6"/>
+              </a:buClr>
+              <a:buSzPct val="90000"/>
+              <a:buFont typeface="Wingdings" panose="05000000000000000000" pitchFamily="2" charset="2"/>
+              <a:buChar char="§"/>
+              <a:defRPr sz="1200" kern="1200">
+                <a:solidFill>
+                  <a:schemeClr val="tx1"/>
+                </a:solidFill>
+                <a:effectLst/>
+                <a:latin typeface="+mn-lt"/>
+                <a:ea typeface="+mn-ea"/>
+                <a:cs typeface="+mn-cs"/>
+              </a:defRPr>
+            </a:lvl5pPr>
+            <a:lvl6pPr marL="2642616" indent="-338328" algn="l" defTabSz="914400" rtl="0" eaLnBrk="1" latinLnBrk="0" hangingPunct="1">
+              <a:lnSpc>
+                <a:spcPct val="120000"/>
+              </a:lnSpc>
+              <a:spcBef>
+                <a:spcPts val="500"/>
+              </a:spcBef>
+              <a:spcAft>
+                <a:spcPts val="600"/>
+              </a:spcAft>
+              <a:buClr>
+                <a:schemeClr val="accent6"/>
+              </a:buClr>
+              <a:buSzPct val="90000"/>
+              <a:buFont typeface="Wingdings" panose="05000000000000000000" pitchFamily="2" charset="2"/>
+              <a:buChar char="§"/>
+              <a:defRPr sz="1200" kern="1200" baseline="0">
+                <a:solidFill>
+                  <a:schemeClr val="tx1"/>
+                </a:solidFill>
+                <a:effectLst/>
+                <a:latin typeface="+mn-lt"/>
+                <a:ea typeface="+mn-ea"/>
+                <a:cs typeface="+mn-cs"/>
+              </a:defRPr>
+            </a:lvl6pPr>
+            <a:lvl7pPr marL="3108960" indent="-338328" algn="l" defTabSz="914400" rtl="0" eaLnBrk="1" latinLnBrk="0" hangingPunct="1">
+              <a:lnSpc>
+                <a:spcPct val="120000"/>
+              </a:lnSpc>
+              <a:spcBef>
+                <a:spcPts val="500"/>
+              </a:spcBef>
+              <a:spcAft>
+                <a:spcPts val="600"/>
+              </a:spcAft>
+              <a:buClr>
+                <a:schemeClr val="accent6"/>
+              </a:buClr>
+              <a:buSzPct val="90000"/>
+              <a:buFont typeface="Wingdings" panose="05000000000000000000" pitchFamily="2" charset="2"/>
+              <a:buChar char="§"/>
+              <a:defRPr sz="1200" kern="1200" baseline="0">
+                <a:solidFill>
+                  <a:schemeClr val="tx1"/>
+                </a:solidFill>
+                <a:effectLst/>
+                <a:latin typeface="+mn-lt"/>
+                <a:ea typeface="+mn-ea"/>
+                <a:cs typeface="+mn-cs"/>
+              </a:defRPr>
+            </a:lvl7pPr>
+            <a:lvl8pPr marL="3575304" indent="-338328" algn="l" defTabSz="914400" rtl="0" eaLnBrk="1" latinLnBrk="0" hangingPunct="1">
+              <a:lnSpc>
+                <a:spcPct val="120000"/>
+              </a:lnSpc>
+              <a:spcBef>
+                <a:spcPts val="500"/>
+              </a:spcBef>
+              <a:spcAft>
+                <a:spcPts val="600"/>
+              </a:spcAft>
+              <a:buClr>
+                <a:schemeClr val="accent6"/>
+              </a:buClr>
+              <a:buSzPct val="90000"/>
+              <a:buFont typeface="Wingdings" panose="05000000000000000000" pitchFamily="2" charset="2"/>
+              <a:buChar char="§"/>
+              <a:defRPr sz="1200" kern="1200" baseline="0">
+                <a:solidFill>
+                  <a:schemeClr val="tx1"/>
+                </a:solidFill>
+                <a:effectLst/>
+                <a:latin typeface="+mn-lt"/>
+                <a:ea typeface="+mn-ea"/>
+                <a:cs typeface="+mn-cs"/>
+              </a:defRPr>
+            </a:lvl8pPr>
+            <a:lvl9pPr marL="4041648" indent="-338328" algn="l" defTabSz="914400" rtl="0" eaLnBrk="1" latinLnBrk="0" hangingPunct="1">
+              <a:lnSpc>
+                <a:spcPct val="120000"/>
+              </a:lnSpc>
+              <a:spcBef>
+                <a:spcPts val="500"/>
+              </a:spcBef>
+              <a:spcAft>
+                <a:spcPts val="600"/>
+              </a:spcAft>
+              <a:buClr>
+                <a:schemeClr val="accent6"/>
+              </a:buClr>
+              <a:buSzPct val="90000"/>
+              <a:buFont typeface="Wingdings" panose="05000000000000000000" pitchFamily="2" charset="2"/>
+              <a:buChar char="§"/>
+              <a:defRPr sz="1200" kern="1200" baseline="0">
+                <a:solidFill>
+                  <a:schemeClr val="tx1"/>
+                </a:solidFill>
+                <a:effectLst/>
+                <a:latin typeface="+mn-lt"/>
+                <a:ea typeface="+mn-ea"/>
+                <a:cs typeface="+mn-cs"/>
+              </a:defRPr>
+            </a:lvl9pPr>
+          </a:lstStyle>
+          <a:p>
+            <a:r>
+              <a:rPr lang="en-US" sz="1600" dirty="0"/>
+              <a:t>vi, “code editor”</a:t>
+            </a:r>
+          </a:p>
+          <a:p>
+            <a:r>
+              <a:rPr lang="en-US" sz="1600" dirty="0"/>
+              <a:t>Evaluation: </a:t>
+            </a:r>
+          </a:p>
+          <a:p>
+            <a:pPr lvl="1"/>
+            <a:r>
+              <a:rPr lang="en-US" sz="1600" dirty="0"/>
+              <a:t>JW: Shocking. Just shocking that some were using this for daily work. /sarcasm. Honestly, though, PyCharm was much better.</a:t>
+            </a:r>
+          </a:p>
+          <a:p>
+            <a:pPr lvl="1"/>
+            <a:r>
+              <a:rPr lang="en-US" sz="1600" dirty="0"/>
+              <a:t>??? (FK), ??? (MS), ??? (AS)</a:t>
+            </a:r>
+          </a:p>
+          <a:p>
+            <a:endParaRPr lang="en-US" sz="1600" dirty="0"/>
+          </a:p>
+        </p:txBody>
+      </p:sp>
     </p:spTree>
     <p:extLst>
       <p:ext uri="{BB962C8B-B14F-4D97-AF65-F5344CB8AC3E}">
         <p14:creationId xmlns:p14="http://schemas.microsoft.com/office/powerpoint/2010/main" val="260664646"/>
+      </p:ext>
+    </p:extLst>
+  </p:cSld>
+  <p:clrMapOvr>
+    <a:masterClrMapping/>
+  </p:clrMapOvr>
+</p:sld>
+</file>
+
+<file path=ppt/slides/slide6.xml><?xml version="1.0" encoding="utf-8"?>
+<p:sld xmlns:a="http://schemas.openxmlformats.org/drawingml/2006/main" xmlns:r="http://schemas.openxmlformats.org/officeDocument/2006/relationships" xmlns:p="http://schemas.openxmlformats.org/presentationml/2006/main">
+  <p:cSld>
+    <p:spTree>
+      <p:nvGrpSpPr>
+        <p:cNvPr id="1" name=""/>
+        <p:cNvGrpSpPr/>
+        <p:nvPr/>
+      </p:nvGrpSpPr>
+      <p:grpSpPr>
+        <a:xfrm>
+          <a:off x="0" y="0"/>
+          <a:ext cx="0" cy="0"/>
+          <a:chOff x="0" y="0"/>
+          <a:chExt cx="0" cy="0"/>
+        </a:xfrm>
+      </p:grpSpPr>
+      <p:sp>
+        <p:nvSpPr>
+          <p:cNvPr id="2" name="Title 1">
+            <a:extLst>
+              <a:ext uri="{FF2B5EF4-FFF2-40B4-BE49-F238E27FC236}">
+                <a16:creationId xmlns:a16="http://schemas.microsoft.com/office/drawing/2014/main" id="{C2B70193-871F-6F41-B602-D83847DF21F3}"/>
+              </a:ext>
+            </a:extLst>
+          </p:cNvPr>
+          <p:cNvSpPr>
+            <a:spLocks noGrp="1"/>
+          </p:cNvSpPr>
+          <p:nvPr>
+            <p:ph type="title"/>
+          </p:nvPr>
+        </p:nvSpPr>
+        <p:spPr/>
+        <p:txBody>
+          <a:bodyPr/>
+          <a:lstStyle/>
+          <a:p>
+            <a:r>
+              <a:rPr lang="en-US" dirty="0"/>
+              <a:t>Challenge: Time zones</a:t>
+            </a:r>
+          </a:p>
+        </p:txBody>
+      </p:sp>
+      <p:sp>
+        <p:nvSpPr>
+          <p:cNvPr id="3" name="Content Placeholder 2">
+            <a:extLst>
+              <a:ext uri="{FF2B5EF4-FFF2-40B4-BE49-F238E27FC236}">
+                <a16:creationId xmlns:a16="http://schemas.microsoft.com/office/drawing/2014/main" id="{241CDF5F-4D7C-A449-A946-DF2136516B9E}"/>
+              </a:ext>
+            </a:extLst>
+          </p:cNvPr>
+          <p:cNvSpPr>
+            <a:spLocks noGrp="1"/>
+          </p:cNvSpPr>
+          <p:nvPr>
+            <p:ph idx="1"/>
+          </p:nvPr>
+        </p:nvSpPr>
+        <p:spPr/>
+        <p:txBody>
+          <a:bodyPr anchor="t">
+            <a:normAutofit/>
+          </a:bodyPr>
+          <a:lstStyle/>
+          <a:p>
+            <a:pPr marL="0" indent="0">
+              <a:buNone/>
+            </a:pPr>
+            <a:r>
+              <a:rPr lang="en-US" sz="3200" dirty="0"/>
+              <a:t>Mitigations:</a:t>
+            </a:r>
+          </a:p>
+          <a:p>
+            <a:r>
+              <a:rPr lang="en-US" sz="2800" dirty="0" err="1"/>
+              <a:t>Asynch</a:t>
+            </a:r>
+            <a:r>
+              <a:rPr lang="en-US" sz="2800" dirty="0"/>
+              <a:t> communication and tools</a:t>
+            </a:r>
+          </a:p>
+          <a:p>
+            <a:pPr lvl="1"/>
+            <a:r>
+              <a:rPr lang="en-US" sz="2400" dirty="0"/>
+              <a:t>Email, Slack, Git/</a:t>
+            </a:r>
+            <a:r>
+              <a:rPr lang="en-US" sz="2400" dirty="0" err="1"/>
+              <a:t>Github</a:t>
+            </a:r>
+            <a:r>
+              <a:rPr lang="en-US" sz="2400" dirty="0"/>
+              <a:t>, Trello</a:t>
+            </a:r>
+          </a:p>
+          <a:p>
+            <a:r>
+              <a:rPr lang="en-US" sz="2800" dirty="0"/>
+              <a:t>Synch catchups weekly</a:t>
+            </a:r>
+          </a:p>
+          <a:p>
+            <a:pPr lvl="1"/>
+            <a:r>
+              <a:rPr lang="en-US" sz="2400" dirty="0" err="1"/>
+              <a:t>Xoom</a:t>
+            </a:r>
+            <a:r>
+              <a:rPr lang="en-US" sz="2400" dirty="0"/>
+              <a:t> / Slack</a:t>
+            </a:r>
+          </a:p>
+        </p:txBody>
+      </p:sp>
+    </p:spTree>
+    <p:extLst>
+      <p:ext uri="{BB962C8B-B14F-4D97-AF65-F5344CB8AC3E}">
+        <p14:creationId xmlns:p14="http://schemas.microsoft.com/office/powerpoint/2010/main" val="3448390588"/>
+      </p:ext>
+    </p:extLst>
+  </p:cSld>
+  <p:clrMapOvr>
+    <a:masterClrMapping/>
+  </p:clrMapOvr>
+</p:sld>
+</file>
+
+<file path=ppt/slides/slide7.xml><?xml version="1.0" encoding="utf-8"?>
+<p:sld xmlns:a="http://schemas.openxmlformats.org/drawingml/2006/main" xmlns:r="http://schemas.openxmlformats.org/officeDocument/2006/relationships" xmlns:p="http://schemas.openxmlformats.org/presentationml/2006/main">
+  <p:cSld>
+    <p:spTree>
+      <p:nvGrpSpPr>
+        <p:cNvPr id="1" name=""/>
+        <p:cNvGrpSpPr/>
+        <p:nvPr/>
+      </p:nvGrpSpPr>
+      <p:grpSpPr>
+        <a:xfrm>
+          <a:off x="0" y="0"/>
+          <a:ext cx="0" cy="0"/>
+          <a:chOff x="0" y="0"/>
+          <a:chExt cx="0" cy="0"/>
+        </a:xfrm>
+      </p:grpSpPr>
+      <p:sp>
+        <p:nvSpPr>
+          <p:cNvPr id="2" name="Title 1">
+            <a:extLst>
+              <a:ext uri="{FF2B5EF4-FFF2-40B4-BE49-F238E27FC236}">
+                <a16:creationId xmlns:a16="http://schemas.microsoft.com/office/drawing/2014/main" id="{C2B70193-871F-6F41-B602-D83847DF21F3}"/>
+              </a:ext>
+            </a:extLst>
+          </p:cNvPr>
+          <p:cNvSpPr>
+            <a:spLocks noGrp="1"/>
+          </p:cNvSpPr>
+          <p:nvPr>
+            <p:ph type="title"/>
+          </p:nvPr>
+        </p:nvSpPr>
+        <p:spPr/>
+        <p:txBody>
+          <a:bodyPr/>
+          <a:lstStyle/>
+          <a:p>
+            <a:r>
+              <a:rPr lang="en-US" dirty="0"/>
+              <a:t>Challenge: Scope</a:t>
+            </a:r>
+          </a:p>
+        </p:txBody>
+      </p:sp>
+      <p:sp>
+        <p:nvSpPr>
+          <p:cNvPr id="3" name="Content Placeholder 2">
+            <a:extLst>
+              <a:ext uri="{FF2B5EF4-FFF2-40B4-BE49-F238E27FC236}">
+                <a16:creationId xmlns:a16="http://schemas.microsoft.com/office/drawing/2014/main" id="{241CDF5F-4D7C-A449-A946-DF2136516B9E}"/>
+              </a:ext>
+            </a:extLst>
+          </p:cNvPr>
+          <p:cNvSpPr>
+            <a:spLocks noGrp="1"/>
+          </p:cNvSpPr>
+          <p:nvPr>
+            <p:ph idx="1"/>
+          </p:nvPr>
+        </p:nvSpPr>
+        <p:spPr>
+          <a:xfrm>
+            <a:off x="1791222" y="2052116"/>
+            <a:ext cx="8778917" cy="3997828"/>
+          </a:xfrm>
+        </p:spPr>
+        <p:txBody>
+          <a:bodyPr anchor="t">
+            <a:normAutofit/>
+          </a:bodyPr>
+          <a:lstStyle/>
+          <a:p>
+            <a:pPr marL="0" indent="0">
+              <a:buNone/>
+            </a:pPr>
+            <a:r>
+              <a:rPr lang="en-US" sz="2400" dirty="0"/>
+              <a:t>Original scope was far too big </a:t>
+            </a:r>
+          </a:p>
+          <a:p>
+            <a:pPr marL="0" indent="0">
+              <a:buNone/>
+            </a:pPr>
+            <a:r>
+              <a:rPr lang="en-US" sz="2400" dirty="0"/>
+              <a:t>	“Twitter with enhancements!”</a:t>
+            </a:r>
+          </a:p>
+          <a:p>
+            <a:pPr marL="0" indent="0">
+              <a:buNone/>
+            </a:pPr>
+            <a:r>
+              <a:rPr lang="en-US" sz="2400" dirty="0"/>
+              <a:t>Mitigations:</a:t>
+            </a:r>
+          </a:p>
+          <a:p>
+            <a:r>
+              <a:rPr lang="en-US" dirty="0"/>
+              <a:t>Cut scope</a:t>
+            </a:r>
+          </a:p>
+          <a:p>
+            <a:r>
+              <a:rPr lang="en-US" dirty="0"/>
+              <a:t>Focus on ‘features’ that made sense together, to deliver reasonable prototype-sized project</a:t>
+            </a:r>
+            <a:endParaRPr lang="en-US" sz="1800" dirty="0"/>
+          </a:p>
+        </p:txBody>
+      </p:sp>
+    </p:spTree>
+    <p:extLst>
+      <p:ext uri="{BB962C8B-B14F-4D97-AF65-F5344CB8AC3E}">
+        <p14:creationId xmlns:p14="http://schemas.microsoft.com/office/powerpoint/2010/main" val="639957633"/>
+      </p:ext>
+    </p:extLst>
+  </p:cSld>
+  <p:clrMapOvr>
+    <a:masterClrMapping/>
+  </p:clrMapOvr>
+</p:sld>
+</file>
+
+<file path=ppt/slides/slide8.xml><?xml version="1.0" encoding="utf-8"?>
+<p:sld xmlns:a="http://schemas.openxmlformats.org/drawingml/2006/main" xmlns:r="http://schemas.openxmlformats.org/officeDocument/2006/relationships" xmlns:p="http://schemas.openxmlformats.org/presentationml/2006/main">
+  <p:cSld>
+    <p:spTree>
+      <p:nvGrpSpPr>
+        <p:cNvPr id="1" name=""/>
+        <p:cNvGrpSpPr/>
+        <p:nvPr/>
+      </p:nvGrpSpPr>
+      <p:grpSpPr>
+        <a:xfrm>
+          <a:off x="0" y="0"/>
+          <a:ext cx="0" cy="0"/>
+          <a:chOff x="0" y="0"/>
+          <a:chExt cx="0" cy="0"/>
+        </a:xfrm>
+      </p:grpSpPr>
+      <p:sp>
+        <p:nvSpPr>
+          <p:cNvPr id="2" name="Title 1">
+            <a:extLst>
+              <a:ext uri="{FF2B5EF4-FFF2-40B4-BE49-F238E27FC236}">
+                <a16:creationId xmlns:a16="http://schemas.microsoft.com/office/drawing/2014/main" id="{D6772943-BEB5-4348-A82E-16EE27B5866E}"/>
+              </a:ext>
+            </a:extLst>
+          </p:cNvPr>
+          <p:cNvSpPr>
+            <a:spLocks noGrp="1"/>
+          </p:cNvSpPr>
+          <p:nvPr>
+            <p:ph type="ctrTitle"/>
+          </p:nvPr>
+        </p:nvSpPr>
+        <p:spPr/>
+        <p:txBody>
+          <a:bodyPr/>
+          <a:lstStyle/>
+          <a:p>
+            <a:r>
+              <a:rPr lang="en-US" dirty="0"/>
+              <a:t>Gritter</a:t>
+            </a:r>
+          </a:p>
+        </p:txBody>
+      </p:sp>
+      <p:sp>
+        <p:nvSpPr>
+          <p:cNvPr id="3" name="Subtitle 2">
+            <a:extLst>
+              <a:ext uri="{FF2B5EF4-FFF2-40B4-BE49-F238E27FC236}">
+                <a16:creationId xmlns:a16="http://schemas.microsoft.com/office/drawing/2014/main" id="{8F3712F9-493A-EC48-B6F2-62CA619F8B55}"/>
+              </a:ext>
+            </a:extLst>
+          </p:cNvPr>
+          <p:cNvSpPr>
+            <a:spLocks noGrp="1"/>
+          </p:cNvSpPr>
+          <p:nvPr>
+            <p:ph type="subTitle" idx="1"/>
+          </p:nvPr>
+        </p:nvSpPr>
+        <p:spPr>
+          <a:xfrm>
+            <a:off x="1571946" y="1390390"/>
+            <a:ext cx="6557928" cy="2038610"/>
+          </a:xfrm>
+        </p:spPr>
+        <p:txBody>
+          <a:bodyPr>
+            <a:normAutofit/>
+          </a:bodyPr>
+          <a:lstStyle/>
+          <a:p>
+            <a:r>
+              <a:rPr lang="en-US" sz="9600" dirty="0"/>
+              <a:t>DEMO</a:t>
+            </a:r>
+          </a:p>
+        </p:txBody>
+      </p:sp>
+    </p:spTree>
+    <p:extLst>
+      <p:ext uri="{BB962C8B-B14F-4D97-AF65-F5344CB8AC3E}">
+        <p14:creationId xmlns:p14="http://schemas.microsoft.com/office/powerpoint/2010/main" val="2167710885"/>
       </p:ext>
     </p:extLst>
   </p:cSld>

</xml_diff>

<commit_message>
Fixed up home page.
</commit_message>
<xml_diff>
--- a/Final Presentation.pptx
+++ b/Final Presentation.pptx
@@ -111,6 +111,11 @@
       </a:defRPr>
     </a:lvl9pPr>
   </p:defaultTextStyle>
+  <p:extLst>
+    <p:ext uri="{EFAFB233-063F-42B5-8137-9DF3F51BA10A}">
+      <p15:sldGuideLst xmlns:p15="http://schemas.microsoft.com/office/powerpoint/2012/main"/>
+    </p:ext>
+  </p:extLst>
 </p:presentation>
 </file>
 
@@ -331,7 +336,7 @@
           <a:p>
             <a:fld id="{9AB3A824-1A51-4B26-AD58-A6D8E14F6C04}" type="datetimeFigureOut">
               <a:rPr lang="en-US" dirty="0"/>
-              <a:t>12/4/20</a:t>
+              <a:t>12/7/20</a:t>
             </a:fld>
             <a:endParaRPr lang="en-US" dirty="0"/>
           </a:p>
@@ -665,7 +670,7 @@
           <a:p>
             <a:fld id="{D857E33E-8B18-4087-B112-809917729534}" type="datetimeFigureOut">
               <a:rPr lang="en-US" dirty="0"/>
-              <a:t>12/4/20</a:t>
+              <a:t>12/7/20</a:t>
             </a:fld>
             <a:endParaRPr lang="en-US" dirty="0"/>
           </a:p>
@@ -967,7 +972,7 @@
           <a:p>
             <a:fld id="{D3FFE419-2371-464F-8239-3959401C3561}" type="datetimeFigureOut">
               <a:rPr lang="en-US" dirty="0"/>
-              <a:t>12/4/20</a:t>
+              <a:t>12/7/20</a:t>
             </a:fld>
             <a:endParaRPr lang="en-US" dirty="0"/>
           </a:p>
@@ -1214,7 +1219,7 @@
           <a:p>
             <a:fld id="{97D162C4-EDD9-4389-A98B-B87ECEA2A816}" type="datetimeFigureOut">
               <a:rPr lang="en-US" dirty="0"/>
-              <a:t>12/4/20</a:t>
+              <a:t>12/7/20</a:t>
             </a:fld>
             <a:endParaRPr lang="en-US" dirty="0"/>
           </a:p>
@@ -1621,7 +1626,7 @@
           <a:p>
             <a:fld id="{3E5059C3-6A89-4494-99FF-5A4D6FFD50EB}" type="datetimeFigureOut">
               <a:rPr lang="en-US" dirty="0"/>
-              <a:t>12/4/20</a:t>
+              <a:t>12/7/20</a:t>
             </a:fld>
             <a:endParaRPr lang="en-US" dirty="0"/>
           </a:p>
@@ -1935,7 +1940,7 @@
           <a:p>
             <a:fld id="{CA954B2F-12DE-47F5-8894-472B206D2E1E}" type="datetimeFigureOut">
               <a:rPr lang="en-US" dirty="0"/>
-              <a:t>12/4/20</a:t>
+              <a:t>12/7/20</a:t>
             </a:fld>
             <a:endParaRPr lang="en-US" dirty="0"/>
           </a:p>
@@ -2479,7 +2484,7 @@
           <a:p>
             <a:fld id="{3F30E46F-7819-4ACF-B48B-48222C2ACC88}" type="datetimeFigureOut">
               <a:rPr lang="en-US" dirty="0"/>
-              <a:t>12/4/20</a:t>
+              <a:t>12/7/20</a:t>
             </a:fld>
             <a:endParaRPr lang="en-US" dirty="0"/>
           </a:p>
@@ -2674,7 +2679,7 @@
           <a:p>
             <a:fld id="{1FAF3416-4057-4DAA-829D-4CA07428D088}" type="datetimeFigureOut">
               <a:rPr lang="en-US" dirty="0"/>
-              <a:t>12/4/20</a:t>
+              <a:t>12/7/20</a:t>
             </a:fld>
             <a:endParaRPr lang="en-US" dirty="0"/>
           </a:p>
@@ -2887,7 +2892,7 @@
           <a:p>
             <a:fld id="{921D9284-D300-4297-87F7-E791DCC15DB1}" type="datetimeFigureOut">
               <a:rPr lang="en-US" dirty="0"/>
-              <a:t>12/4/20</a:t>
+              <a:t>12/7/20</a:t>
             </a:fld>
             <a:endParaRPr lang="en-US" dirty="0"/>
           </a:p>
@@ -3256,7 +3261,7 @@
           <a:p>
             <a:fld id="{37D525BB-DA17-4BA0-B3C8-3AC3ABC827E6}" type="datetimeFigureOut">
               <a:rPr lang="en-US" dirty="0"/>
-              <a:t>12/4/20</a:t>
+              <a:t>12/7/20</a:t>
             </a:fld>
             <a:endParaRPr lang="en-US" dirty="0"/>
           </a:p>
@@ -3659,7 +3664,7 @@
           <a:p>
             <a:fld id="{B16C4C9A-3960-41CF-A4E9-2A8FB932454B}" type="datetimeFigureOut">
               <a:rPr lang="en-US" dirty="0"/>
-              <a:t>12/4/20</a:t>
+              <a:t>12/7/20</a:t>
             </a:fld>
             <a:endParaRPr lang="en-US" dirty="0"/>
           </a:p>
@@ -3970,7 +3975,7 @@
           <a:p>
             <a:fld id="{3CBC1C18-307B-4F68-A007-B5B542270E8D}" type="datetimeFigureOut">
               <a:rPr lang="en-US" dirty="0"/>
-              <a:t>12/4/20</a:t>
+              <a:t>12/7/20</a:t>
             </a:fld>
             <a:endParaRPr lang="en-US" dirty="0"/>
           </a:p>
@@ -6718,12 +6723,16 @@
           <a:p>
             <a:pPr lvl="1"/>
             <a:r>
-              <a:rPr lang="en-US" sz="2400" dirty="0" err="1"/>
-              <a:t>Xoom</a:t>
-            </a:r>
-            <a:r>
               <a:rPr lang="en-US" sz="2400" dirty="0"/>
-              <a:t> / Slack</a:t>
+              <a:t>Z</a:t>
+            </a:r>
+            <a:r>
+              <a:rPr lang="en-US" sz="2400"/>
+              <a:t>oom </a:t>
+            </a:r>
+            <a:r>
+              <a:rPr lang="en-US" sz="2400" dirty="0"/>
+              <a:t>/ Slack</a:t>
             </a:r>
           </a:p>
         </p:txBody>

</xml_diff>